<commit_message>
Updated one of the figures
</commit_message>
<xml_diff>
--- a/PAPER/experiments/kmers-16/workflow.pptx
+++ b/PAPER/experiments/kmers-16/workflow.pptx
@@ -6,6 +6,8 @@
   </p:sldMasterIdLst>
   <p:sldIdLst>
     <p:sldId id="257" r:id="rId2"/>
+    <p:sldId id="258" r:id="rId3"/>
+    <p:sldId id="259" r:id="rId4"/>
   </p:sldIdLst>
   <p:sldSz cx="9144000" cy="6858000" type="screen4x3"/>
   <p:notesSz cx="6858000" cy="9144000"/>
@@ -288,7 +290,7 @@
           <a:p>
             <a:fld id="{3CFB7E3E-4B31-CD43-B9D1-D287CF8B0596}" type="datetimeFigureOut">
               <a:rPr lang="en-US" smtClean="0"/>
-              <a:t>24/02/15</a:t>
+              <a:t>23/03/15</a:t>
             </a:fld>
             <a:endParaRPr lang="en-US"/>
           </a:p>
@@ -458,7 +460,7 @@
           <a:p>
             <a:fld id="{3CFB7E3E-4B31-CD43-B9D1-D287CF8B0596}" type="datetimeFigureOut">
               <a:rPr lang="en-US" smtClean="0"/>
-              <a:t>24/02/15</a:t>
+              <a:t>23/03/15</a:t>
             </a:fld>
             <a:endParaRPr lang="en-US"/>
           </a:p>
@@ -638,7 +640,7 @@
           <a:p>
             <a:fld id="{3CFB7E3E-4B31-CD43-B9D1-D287CF8B0596}" type="datetimeFigureOut">
               <a:rPr lang="en-US" smtClean="0"/>
-              <a:t>24/02/15</a:t>
+              <a:t>23/03/15</a:t>
             </a:fld>
             <a:endParaRPr lang="en-US"/>
           </a:p>
@@ -808,7 +810,7 @@
           <a:p>
             <a:fld id="{3CFB7E3E-4B31-CD43-B9D1-D287CF8B0596}" type="datetimeFigureOut">
               <a:rPr lang="en-US" smtClean="0"/>
-              <a:t>24/02/15</a:t>
+              <a:t>23/03/15</a:t>
             </a:fld>
             <a:endParaRPr lang="en-US"/>
           </a:p>
@@ -1054,7 +1056,7 @@
           <a:p>
             <a:fld id="{3CFB7E3E-4B31-CD43-B9D1-D287CF8B0596}" type="datetimeFigureOut">
               <a:rPr lang="en-US" smtClean="0"/>
-              <a:t>24/02/15</a:t>
+              <a:t>23/03/15</a:t>
             </a:fld>
             <a:endParaRPr lang="en-US"/>
           </a:p>
@@ -1342,7 +1344,7 @@
           <a:p>
             <a:fld id="{3CFB7E3E-4B31-CD43-B9D1-D287CF8B0596}" type="datetimeFigureOut">
               <a:rPr lang="en-US" smtClean="0"/>
-              <a:t>24/02/15</a:t>
+              <a:t>23/03/15</a:t>
             </a:fld>
             <a:endParaRPr lang="en-US"/>
           </a:p>
@@ -1764,7 +1766,7 @@
           <a:p>
             <a:fld id="{3CFB7E3E-4B31-CD43-B9D1-D287CF8B0596}" type="datetimeFigureOut">
               <a:rPr lang="en-US" smtClean="0"/>
-              <a:t>24/02/15</a:t>
+              <a:t>23/03/15</a:t>
             </a:fld>
             <a:endParaRPr lang="en-US"/>
           </a:p>
@@ -1882,7 +1884,7 @@
           <a:p>
             <a:fld id="{3CFB7E3E-4B31-CD43-B9D1-D287CF8B0596}" type="datetimeFigureOut">
               <a:rPr lang="en-US" smtClean="0"/>
-              <a:t>24/02/15</a:t>
+              <a:t>23/03/15</a:t>
             </a:fld>
             <a:endParaRPr lang="en-US"/>
           </a:p>
@@ -1977,7 +1979,7 @@
           <a:p>
             <a:fld id="{3CFB7E3E-4B31-CD43-B9D1-D287CF8B0596}" type="datetimeFigureOut">
               <a:rPr lang="en-US" smtClean="0"/>
-              <a:t>24/02/15</a:t>
+              <a:t>23/03/15</a:t>
             </a:fld>
             <a:endParaRPr lang="en-US"/>
           </a:p>
@@ -2254,7 +2256,7 @@
           <a:p>
             <a:fld id="{3CFB7E3E-4B31-CD43-B9D1-D287CF8B0596}" type="datetimeFigureOut">
               <a:rPr lang="en-US" smtClean="0"/>
-              <a:t>24/02/15</a:t>
+              <a:t>23/03/15</a:t>
             </a:fld>
             <a:endParaRPr lang="en-US"/>
           </a:p>
@@ -2507,7 +2509,7 @@
           <a:p>
             <a:fld id="{3CFB7E3E-4B31-CD43-B9D1-D287CF8B0596}" type="datetimeFigureOut">
               <a:rPr lang="en-US" smtClean="0"/>
-              <a:t>24/02/15</a:t>
+              <a:t>23/03/15</a:t>
             </a:fld>
             <a:endParaRPr lang="en-US"/>
           </a:p>
@@ -2720,7 +2722,7 @@
           <a:p>
             <a:fld id="{3CFB7E3E-4B31-CD43-B9D1-D287CF8B0596}" type="datetimeFigureOut">
               <a:rPr lang="en-US" smtClean="0"/>
-              <a:t>24/02/15</a:t>
+              <a:t>23/03/15</a:t>
             </a:fld>
             <a:endParaRPr lang="en-US"/>
           </a:p>
@@ -3201,15 +3203,7 @@
                   <a:schemeClr val="tx1"/>
                 </a:solidFill>
               </a:rPr>
-              <a:t>150 </a:t>
-            </a:r>
-            <a:r>
-              <a:rPr lang="en-NZ" sz="1600" dirty="0" smtClean="0">
-                <a:solidFill>
-                  <a:schemeClr val="tx1"/>
-                </a:solidFill>
-              </a:rPr>
-              <a:t>bp</a:t>
+              <a:t>150 bp</a:t>
             </a:r>
             <a:endParaRPr lang="en-NZ" sz="1600" dirty="0">
               <a:solidFill>
@@ -4439,6 +4433,1318 @@
     <p:extLst>
       <p:ext uri="{BB962C8B-B14F-4D97-AF65-F5344CB8AC3E}">
         <p14:creationId xmlns:p14="http://schemas.microsoft.com/office/powerpoint/2010/main" val="1011705304"/>
+      </p:ext>
+    </p:extLst>
+  </p:cSld>
+  <p:clrMapOvr>
+    <a:masterClrMapping/>
+  </p:clrMapOvr>
+  <p:timing>
+    <p:tnLst>
+      <p:par>
+        <p:cTn xmlns:p14="http://schemas.microsoft.com/office/powerpoint/2010/main" id="1" dur="indefinite" restart="never" nodeType="tmRoot"/>
+      </p:par>
+    </p:tnLst>
+  </p:timing>
+</p:sld>
+</file>
+
+<file path=ppt/slides/slide2.xml><?xml version="1.0" encoding="utf-8"?>
+<p:sld xmlns:a="http://schemas.openxmlformats.org/drawingml/2006/main" xmlns:r="http://schemas.openxmlformats.org/officeDocument/2006/relationships" xmlns:p="http://schemas.openxmlformats.org/presentationml/2006/main">
+  <p:cSld>
+    <p:spTree>
+      <p:nvGrpSpPr>
+        <p:cNvPr id="1" name=""/>
+        <p:cNvGrpSpPr/>
+        <p:nvPr/>
+      </p:nvGrpSpPr>
+      <p:grpSpPr>
+        <a:xfrm>
+          <a:off x="0" y="0"/>
+          <a:ext cx="0" cy="0"/>
+          <a:chOff x="0" y="0"/>
+          <a:chExt cx="0" cy="0"/>
+        </a:xfrm>
+      </p:grpSpPr>
+      <p:sp>
+        <p:nvSpPr>
+          <p:cNvPr id="2" name="Title 1"/>
+          <p:cNvSpPr>
+            <a:spLocks noGrp="1"/>
+          </p:cNvSpPr>
+          <p:nvPr>
+            <p:ph type="title"/>
+          </p:nvPr>
+        </p:nvSpPr>
+        <p:spPr/>
+        <p:txBody>
+          <a:bodyPr/>
+          <a:lstStyle/>
+          <a:p>
+            <a:endParaRPr lang="en-US"/>
+          </a:p>
+        </p:txBody>
+      </p:sp>
+      <p:sp>
+        <p:nvSpPr>
+          <p:cNvPr id="3" name="Content Placeholder 2"/>
+          <p:cNvSpPr>
+            <a:spLocks noGrp="1"/>
+          </p:cNvSpPr>
+          <p:nvPr>
+            <p:ph idx="1"/>
+          </p:nvPr>
+        </p:nvSpPr>
+        <p:spPr/>
+        <p:txBody>
+          <a:bodyPr/>
+          <a:lstStyle/>
+          <a:p>
+            <a:endParaRPr lang="en-US"/>
+          </a:p>
+        </p:txBody>
+      </p:sp>
+    </p:spTree>
+    <p:extLst>
+      <p:ext uri="{BB962C8B-B14F-4D97-AF65-F5344CB8AC3E}">
+        <p14:creationId xmlns:p14="http://schemas.microsoft.com/office/powerpoint/2010/main" val="2587880282"/>
+      </p:ext>
+    </p:extLst>
+  </p:cSld>
+  <p:clrMapOvr>
+    <a:masterClrMapping/>
+  </p:clrMapOvr>
+</p:sld>
+</file>
+
+<file path=ppt/slides/slide3.xml><?xml version="1.0" encoding="utf-8"?>
+<p:sld xmlns:a="http://schemas.openxmlformats.org/drawingml/2006/main" xmlns:r="http://schemas.openxmlformats.org/officeDocument/2006/relationships" xmlns:p="http://schemas.openxmlformats.org/presentationml/2006/main">
+  <p:cSld>
+    <p:spTree>
+      <p:nvGrpSpPr>
+        <p:cNvPr id="1" name=""/>
+        <p:cNvGrpSpPr/>
+        <p:nvPr/>
+      </p:nvGrpSpPr>
+      <p:grpSpPr>
+        <a:xfrm>
+          <a:off x="0" y="0"/>
+          <a:ext cx="0" cy="0"/>
+          <a:chOff x="0" y="0"/>
+          <a:chExt cx="0" cy="0"/>
+        </a:xfrm>
+      </p:grpSpPr>
+      <p:grpSp>
+        <p:nvGrpSpPr>
+          <p:cNvPr id="2" name="Group 1"/>
+          <p:cNvGrpSpPr/>
+          <p:nvPr/>
+        </p:nvGrpSpPr>
+        <p:grpSpPr>
+          <a:xfrm>
+            <a:off x="395537" y="230660"/>
+            <a:ext cx="4035672" cy="4699735"/>
+            <a:chOff x="395536" y="230659"/>
+            <a:chExt cx="5833308" cy="6047563"/>
+          </a:xfrm>
+        </p:grpSpPr>
+        <p:sp>
+          <p:nvSpPr>
+            <p:cNvPr id="4" name="Flowchart: Magnetic Disk 3"/>
+            <p:cNvSpPr/>
+            <p:nvPr/>
+          </p:nvSpPr>
+          <p:spPr>
+            <a:xfrm>
+              <a:off x="1759372" y="1519927"/>
+              <a:ext cx="1186393" cy="908838"/>
+            </a:xfrm>
+            <a:prstGeom prst="flowChartMagneticDisk">
+              <a:avLst/>
+            </a:prstGeom>
+            <a:noFill/>
+            <a:ln>
+              <a:solidFill>
+                <a:schemeClr val="tx1"/>
+              </a:solidFill>
+            </a:ln>
+          </p:spPr>
+          <p:style>
+            <a:lnRef idx="2">
+              <a:schemeClr val="accent1">
+                <a:shade val="50000"/>
+              </a:schemeClr>
+            </a:lnRef>
+            <a:fillRef idx="1">
+              <a:schemeClr val="accent1"/>
+            </a:fillRef>
+            <a:effectRef idx="0">
+              <a:schemeClr val="accent1"/>
+            </a:effectRef>
+            <a:fontRef idx="minor">
+              <a:schemeClr val="lt1"/>
+            </a:fontRef>
+          </p:style>
+          <p:txBody>
+            <a:bodyPr rtlCol="0" anchor="ctr"/>
+            <a:lstStyle/>
+            <a:p>
+              <a:pPr algn="ctr"/>
+              <a:r>
+                <a:rPr lang="en-NZ" sz="1100" dirty="0" smtClean="0">
+                  <a:solidFill>
+                    <a:schemeClr val="tx1"/>
+                  </a:solidFill>
+                </a:rPr>
+                <a:t>COI sequences</a:t>
+              </a:r>
+              <a:endParaRPr lang="en-NZ" sz="1100" dirty="0">
+                <a:solidFill>
+                  <a:schemeClr val="tx1"/>
+                </a:solidFill>
+              </a:endParaRPr>
+            </a:p>
+          </p:txBody>
+        </p:sp>
+        <p:sp>
+          <p:nvSpPr>
+            <p:cNvPr id="5" name="Flowchart: Magnetic Disk 4"/>
+            <p:cNvSpPr/>
+            <p:nvPr/>
+          </p:nvSpPr>
+          <p:spPr>
+            <a:xfrm>
+              <a:off x="1259632" y="3338560"/>
+              <a:ext cx="765337" cy="908838"/>
+            </a:xfrm>
+            <a:prstGeom prst="flowChartMagneticDisk">
+              <a:avLst/>
+            </a:prstGeom>
+            <a:noFill/>
+            <a:ln>
+              <a:solidFill>
+                <a:schemeClr val="tx1"/>
+              </a:solidFill>
+            </a:ln>
+          </p:spPr>
+          <p:style>
+            <a:lnRef idx="2">
+              <a:schemeClr val="accent1">
+                <a:shade val="50000"/>
+              </a:schemeClr>
+            </a:lnRef>
+            <a:fillRef idx="1">
+              <a:schemeClr val="accent1"/>
+            </a:fillRef>
+            <a:effectRef idx="0">
+              <a:schemeClr val="accent1"/>
+            </a:effectRef>
+            <a:fontRef idx="minor">
+              <a:schemeClr val="lt1"/>
+            </a:fontRef>
+          </p:style>
+          <p:txBody>
+            <a:bodyPr rtlCol="0" anchor="ctr"/>
+            <a:lstStyle/>
+            <a:p>
+              <a:pPr algn="ctr"/>
+              <a:r>
+                <a:rPr lang="en-NZ" sz="1100" dirty="0" smtClean="0">
+                  <a:solidFill>
+                    <a:schemeClr val="tx1"/>
+                  </a:solidFill>
+                </a:rPr>
+                <a:t>150 bp</a:t>
+              </a:r>
+              <a:endParaRPr lang="en-NZ" sz="1100" dirty="0">
+                <a:solidFill>
+                  <a:schemeClr val="tx1"/>
+                </a:solidFill>
+              </a:endParaRPr>
+            </a:p>
+          </p:txBody>
+        </p:sp>
+        <p:sp>
+          <p:nvSpPr>
+            <p:cNvPr id="6" name="Flowchart: Magnetic Disk 5"/>
+            <p:cNvSpPr/>
+            <p:nvPr/>
+          </p:nvSpPr>
+          <p:spPr>
+            <a:xfrm>
+              <a:off x="3602191" y="3338560"/>
+              <a:ext cx="765337" cy="908838"/>
+            </a:xfrm>
+            <a:prstGeom prst="flowChartMagneticDisk">
+              <a:avLst/>
+            </a:prstGeom>
+            <a:noFill/>
+            <a:ln>
+              <a:solidFill>
+                <a:schemeClr val="tx1"/>
+              </a:solidFill>
+            </a:ln>
+          </p:spPr>
+          <p:style>
+            <a:lnRef idx="2">
+              <a:schemeClr val="accent1">
+                <a:shade val="50000"/>
+              </a:schemeClr>
+            </a:lnRef>
+            <a:fillRef idx="1">
+              <a:schemeClr val="accent1"/>
+            </a:fillRef>
+            <a:effectRef idx="0">
+              <a:schemeClr val="accent1"/>
+            </a:effectRef>
+            <a:fontRef idx="minor">
+              <a:schemeClr val="lt1"/>
+            </a:fontRef>
+          </p:style>
+          <p:txBody>
+            <a:bodyPr rtlCol="0" anchor="ctr"/>
+            <a:lstStyle/>
+            <a:p>
+              <a:pPr algn="ctr"/>
+              <a:r>
+                <a:rPr lang="en-NZ" sz="1100" dirty="0" smtClean="0">
+                  <a:solidFill>
+                    <a:schemeClr val="tx1"/>
+                  </a:solidFill>
+                </a:rPr>
+                <a:t>300 bp</a:t>
+              </a:r>
+              <a:endParaRPr lang="en-NZ" sz="1100" dirty="0">
+                <a:solidFill>
+                  <a:schemeClr val="tx1"/>
+                </a:solidFill>
+              </a:endParaRPr>
+            </a:p>
+          </p:txBody>
+        </p:sp>
+        <p:sp>
+          <p:nvSpPr>
+            <p:cNvPr id="7" name="Flowchart: Magnetic Disk 6"/>
+            <p:cNvSpPr/>
+            <p:nvPr/>
+          </p:nvSpPr>
+          <p:spPr>
+            <a:xfrm>
+              <a:off x="4549714" y="3338561"/>
+              <a:ext cx="765337" cy="908838"/>
+            </a:xfrm>
+            <a:prstGeom prst="flowChartMagneticDisk">
+              <a:avLst/>
+            </a:prstGeom>
+            <a:noFill/>
+            <a:ln>
+              <a:solidFill>
+                <a:schemeClr val="tx1"/>
+              </a:solidFill>
+            </a:ln>
+          </p:spPr>
+          <p:style>
+            <a:lnRef idx="2">
+              <a:schemeClr val="accent1">
+                <a:shade val="50000"/>
+              </a:schemeClr>
+            </a:lnRef>
+            <a:fillRef idx="1">
+              <a:schemeClr val="accent1"/>
+            </a:fillRef>
+            <a:effectRef idx="0">
+              <a:schemeClr val="accent1"/>
+            </a:effectRef>
+            <a:fontRef idx="minor">
+              <a:schemeClr val="lt1"/>
+            </a:fontRef>
+          </p:style>
+          <p:txBody>
+            <a:bodyPr rtlCol="0" anchor="ctr"/>
+            <a:lstStyle/>
+            <a:p>
+              <a:pPr algn="ctr"/>
+              <a:r>
+                <a:rPr lang="en-NZ" sz="1100" dirty="0" smtClean="0">
+                  <a:solidFill>
+                    <a:schemeClr val="tx1"/>
+                  </a:solidFill>
+                </a:rPr>
+                <a:t>450 bp</a:t>
+              </a:r>
+              <a:endParaRPr lang="en-NZ" sz="1100" dirty="0">
+                <a:solidFill>
+                  <a:schemeClr val="tx1"/>
+                </a:solidFill>
+              </a:endParaRPr>
+            </a:p>
+          </p:txBody>
+        </p:sp>
+        <p:sp>
+          <p:nvSpPr>
+            <p:cNvPr id="8" name="Flowchart: Magnetic Disk 7"/>
+            <p:cNvSpPr/>
+            <p:nvPr/>
+          </p:nvSpPr>
+          <p:spPr>
+            <a:xfrm>
+              <a:off x="5463507" y="3338560"/>
+              <a:ext cx="765337" cy="908838"/>
+            </a:xfrm>
+            <a:prstGeom prst="flowChartMagneticDisk">
+              <a:avLst/>
+            </a:prstGeom>
+            <a:noFill/>
+            <a:ln>
+              <a:solidFill>
+                <a:schemeClr val="tx1"/>
+              </a:solidFill>
+            </a:ln>
+          </p:spPr>
+          <p:style>
+            <a:lnRef idx="2">
+              <a:schemeClr val="accent1">
+                <a:shade val="50000"/>
+              </a:schemeClr>
+            </a:lnRef>
+            <a:fillRef idx="1">
+              <a:schemeClr val="accent1"/>
+            </a:fillRef>
+            <a:effectRef idx="0">
+              <a:schemeClr val="accent1"/>
+            </a:effectRef>
+            <a:fontRef idx="minor">
+              <a:schemeClr val="lt1"/>
+            </a:fontRef>
+          </p:style>
+          <p:txBody>
+            <a:bodyPr rtlCol="0" anchor="ctr"/>
+            <a:lstStyle/>
+            <a:p>
+              <a:pPr algn="ctr"/>
+              <a:r>
+                <a:rPr lang="en-NZ" sz="1100" dirty="0" smtClean="0">
+                  <a:solidFill>
+                    <a:schemeClr val="tx1"/>
+                  </a:solidFill>
+                </a:rPr>
+                <a:t>600+ bp</a:t>
+              </a:r>
+              <a:endParaRPr lang="en-NZ" sz="1100" dirty="0">
+                <a:solidFill>
+                  <a:schemeClr val="tx1"/>
+                </a:solidFill>
+              </a:endParaRPr>
+            </a:p>
+          </p:txBody>
+        </p:sp>
+        <p:cxnSp>
+          <p:nvCxnSpPr>
+            <p:cNvPr id="15" name="Straight Arrow Connector 14"/>
+            <p:cNvCxnSpPr>
+              <a:stCxn id="4" idx="3"/>
+              <a:endCxn id="5" idx="1"/>
+            </p:cNvCxnSpPr>
+            <p:nvPr/>
+          </p:nvCxnSpPr>
+          <p:spPr>
+            <a:xfrm flipH="1">
+              <a:off x="1642302" y="2428764"/>
+              <a:ext cx="710267" cy="909795"/>
+            </a:xfrm>
+            <a:prstGeom prst="straightConnector1">
+              <a:avLst/>
+            </a:prstGeom>
+            <a:ln w="25400">
+              <a:solidFill>
+                <a:schemeClr val="tx1"/>
+              </a:solidFill>
+              <a:tailEnd type="arrow"/>
+            </a:ln>
+          </p:spPr>
+          <p:style>
+            <a:lnRef idx="1">
+              <a:schemeClr val="accent1"/>
+            </a:lnRef>
+            <a:fillRef idx="0">
+              <a:schemeClr val="accent1"/>
+            </a:fillRef>
+            <a:effectRef idx="0">
+              <a:schemeClr val="accent1"/>
+            </a:effectRef>
+            <a:fontRef idx="minor">
+              <a:schemeClr val="tx1"/>
+            </a:fontRef>
+          </p:style>
+        </p:cxnSp>
+        <p:cxnSp>
+          <p:nvCxnSpPr>
+            <p:cNvPr id="17" name="Straight Arrow Connector 16"/>
+            <p:cNvCxnSpPr>
+              <a:stCxn id="4" idx="3"/>
+              <a:endCxn id="6" idx="1"/>
+            </p:cNvCxnSpPr>
+            <p:nvPr/>
+          </p:nvCxnSpPr>
+          <p:spPr>
+            <a:xfrm>
+              <a:off x="2352569" y="2428765"/>
+              <a:ext cx="1632291" cy="909795"/>
+            </a:xfrm>
+            <a:prstGeom prst="straightConnector1">
+              <a:avLst/>
+            </a:prstGeom>
+            <a:ln w="25400">
+              <a:solidFill>
+                <a:schemeClr val="tx1"/>
+              </a:solidFill>
+              <a:tailEnd type="arrow"/>
+            </a:ln>
+          </p:spPr>
+          <p:style>
+            <a:lnRef idx="1">
+              <a:schemeClr val="accent1"/>
+            </a:lnRef>
+            <a:fillRef idx="0">
+              <a:schemeClr val="accent1"/>
+            </a:fillRef>
+            <a:effectRef idx="0">
+              <a:schemeClr val="accent1"/>
+            </a:effectRef>
+            <a:fontRef idx="minor">
+              <a:schemeClr val="tx1"/>
+            </a:fontRef>
+          </p:style>
+        </p:cxnSp>
+        <p:cxnSp>
+          <p:nvCxnSpPr>
+            <p:cNvPr id="19" name="Straight Arrow Connector 18"/>
+            <p:cNvCxnSpPr>
+              <a:stCxn id="4" idx="3"/>
+              <a:endCxn id="7" idx="1"/>
+            </p:cNvCxnSpPr>
+            <p:nvPr/>
+          </p:nvCxnSpPr>
+          <p:spPr>
+            <a:xfrm>
+              <a:off x="2352569" y="2428765"/>
+              <a:ext cx="2579814" cy="909796"/>
+            </a:xfrm>
+            <a:prstGeom prst="straightConnector1">
+              <a:avLst/>
+            </a:prstGeom>
+            <a:ln w="25400">
+              <a:solidFill>
+                <a:schemeClr val="tx1"/>
+              </a:solidFill>
+              <a:tailEnd type="arrow"/>
+            </a:ln>
+          </p:spPr>
+          <p:style>
+            <a:lnRef idx="1">
+              <a:schemeClr val="accent1"/>
+            </a:lnRef>
+            <a:fillRef idx="0">
+              <a:schemeClr val="accent1"/>
+            </a:fillRef>
+            <a:effectRef idx="0">
+              <a:schemeClr val="accent1"/>
+            </a:effectRef>
+            <a:fontRef idx="minor">
+              <a:schemeClr val="tx1"/>
+            </a:fontRef>
+          </p:style>
+        </p:cxnSp>
+        <p:cxnSp>
+          <p:nvCxnSpPr>
+            <p:cNvPr id="21" name="Straight Arrow Connector 20"/>
+            <p:cNvCxnSpPr>
+              <a:stCxn id="4" idx="3"/>
+              <a:endCxn id="8" idx="1"/>
+            </p:cNvCxnSpPr>
+            <p:nvPr/>
+          </p:nvCxnSpPr>
+          <p:spPr>
+            <a:xfrm>
+              <a:off x="2352569" y="2428765"/>
+              <a:ext cx="3493607" cy="909795"/>
+            </a:xfrm>
+            <a:prstGeom prst="straightConnector1">
+              <a:avLst/>
+            </a:prstGeom>
+            <a:ln w="25400">
+              <a:solidFill>
+                <a:schemeClr val="tx1"/>
+              </a:solidFill>
+              <a:tailEnd type="arrow"/>
+            </a:ln>
+          </p:spPr>
+          <p:style>
+            <a:lnRef idx="1">
+              <a:schemeClr val="accent1"/>
+            </a:lnRef>
+            <a:fillRef idx="0">
+              <a:schemeClr val="accent1"/>
+            </a:fillRef>
+            <a:effectRef idx="0">
+              <a:schemeClr val="accent1"/>
+            </a:effectRef>
+            <a:fontRef idx="minor">
+              <a:schemeClr val="tx1"/>
+            </a:fontRef>
+          </p:style>
+        </p:cxnSp>
+        <p:sp>
+          <p:nvSpPr>
+            <p:cNvPr id="9" name="Snip Single Corner Rectangle 8"/>
+            <p:cNvSpPr/>
+            <p:nvPr/>
+          </p:nvSpPr>
+          <p:spPr>
+            <a:xfrm>
+              <a:off x="395536" y="5301206"/>
+              <a:ext cx="746463" cy="977016"/>
+            </a:xfrm>
+            <a:prstGeom prst="snip1Rect">
+              <a:avLst/>
+            </a:prstGeom>
+            <a:noFill/>
+            <a:ln>
+              <a:solidFill>
+                <a:schemeClr val="tx1"/>
+              </a:solidFill>
+            </a:ln>
+          </p:spPr>
+          <p:style>
+            <a:lnRef idx="2">
+              <a:schemeClr val="accent1">
+                <a:shade val="50000"/>
+              </a:schemeClr>
+            </a:lnRef>
+            <a:fillRef idx="1">
+              <a:schemeClr val="accent1"/>
+            </a:fillRef>
+            <a:effectRef idx="0">
+              <a:schemeClr val="accent1"/>
+            </a:effectRef>
+            <a:fontRef idx="minor">
+              <a:schemeClr val="lt1"/>
+            </a:fontRef>
+          </p:style>
+          <p:txBody>
+            <a:bodyPr rtlCol="0" anchor="ctr"/>
+            <a:lstStyle/>
+            <a:p>
+              <a:pPr algn="ctr"/>
+              <a:r>
+                <a:rPr lang="en-NZ" sz="1200" dirty="0" smtClean="0">
+                  <a:solidFill>
+                    <a:schemeClr val="tx1"/>
+                  </a:solidFill>
+                </a:rPr>
+                <a:t>k</a:t>
+              </a:r>
+              <a:r>
+                <a:rPr lang="en-NZ" sz="1200" baseline="-25000" dirty="0" smtClean="0">
+                  <a:solidFill>
+                    <a:schemeClr val="tx1"/>
+                  </a:solidFill>
+                </a:rPr>
+                <a:t>min</a:t>
+              </a:r>
+              <a:r>
+                <a:rPr lang="en-NZ" sz="1200" dirty="0" smtClean="0">
+                  <a:solidFill>
+                    <a:schemeClr val="tx1"/>
+                  </a:solidFill>
+                </a:rPr>
+                <a:t>=1</a:t>
+              </a:r>
+            </a:p>
+            <a:p>
+              <a:pPr algn="ctr"/>
+              <a:r>
+                <a:rPr lang="en-NZ" sz="1200" dirty="0" smtClean="0">
+                  <a:solidFill>
+                    <a:schemeClr val="tx1"/>
+                  </a:solidFill>
+                </a:rPr>
+                <a:t>k</a:t>
+              </a:r>
+              <a:r>
+                <a:rPr lang="en-NZ" sz="1200" baseline="-25000" dirty="0" smtClean="0">
+                  <a:solidFill>
+                    <a:schemeClr val="tx1"/>
+                  </a:solidFill>
+                </a:rPr>
+                <a:t>max</a:t>
+              </a:r>
+              <a:r>
+                <a:rPr lang="en-NZ" sz="1200" dirty="0" smtClean="0">
+                  <a:solidFill>
+                    <a:schemeClr val="tx1"/>
+                  </a:solidFill>
+                </a:rPr>
+                <a:t>=1</a:t>
+              </a:r>
+              <a:endParaRPr lang="en-NZ" sz="1200" dirty="0">
+                <a:solidFill>
+                  <a:schemeClr val="tx1"/>
+                </a:solidFill>
+              </a:endParaRPr>
+            </a:p>
+          </p:txBody>
+        </p:sp>
+        <p:cxnSp>
+          <p:nvCxnSpPr>
+            <p:cNvPr id="11" name="Straight Arrow Connector 10"/>
+            <p:cNvCxnSpPr>
+              <a:stCxn id="5" idx="3"/>
+              <a:endCxn id="9" idx="3"/>
+            </p:cNvCxnSpPr>
+            <p:nvPr/>
+          </p:nvCxnSpPr>
+          <p:spPr>
+            <a:xfrm flipH="1">
+              <a:off x="768768" y="4247398"/>
+              <a:ext cx="873534" cy="1053809"/>
+            </a:xfrm>
+            <a:prstGeom prst="straightConnector1">
+              <a:avLst/>
+            </a:prstGeom>
+            <a:ln w="25400">
+              <a:solidFill>
+                <a:schemeClr val="tx1"/>
+              </a:solidFill>
+              <a:tailEnd type="arrow"/>
+            </a:ln>
+          </p:spPr>
+          <p:style>
+            <a:lnRef idx="1">
+              <a:schemeClr val="accent1"/>
+            </a:lnRef>
+            <a:fillRef idx="0">
+              <a:schemeClr val="accent1"/>
+            </a:fillRef>
+            <a:effectRef idx="0">
+              <a:schemeClr val="accent1"/>
+            </a:effectRef>
+            <a:fontRef idx="minor">
+              <a:schemeClr val="tx1"/>
+            </a:fontRef>
+          </p:style>
+        </p:cxnSp>
+        <p:cxnSp>
+          <p:nvCxnSpPr>
+            <p:cNvPr id="20" name="Straight Arrow Connector 19"/>
+            <p:cNvCxnSpPr>
+              <a:stCxn id="5" idx="3"/>
+              <a:endCxn id="72" idx="3"/>
+            </p:cNvCxnSpPr>
+            <p:nvPr/>
+          </p:nvCxnSpPr>
+          <p:spPr>
+            <a:xfrm>
+              <a:off x="1642302" y="4247398"/>
+              <a:ext cx="25330" cy="1054157"/>
+            </a:xfrm>
+            <a:prstGeom prst="straightConnector1">
+              <a:avLst/>
+            </a:prstGeom>
+            <a:ln w="25400">
+              <a:solidFill>
+                <a:schemeClr val="tx1"/>
+              </a:solidFill>
+              <a:tailEnd type="arrow"/>
+            </a:ln>
+          </p:spPr>
+          <p:style>
+            <a:lnRef idx="1">
+              <a:schemeClr val="accent1"/>
+            </a:lnRef>
+            <a:fillRef idx="0">
+              <a:schemeClr val="accent1"/>
+            </a:fillRef>
+            <a:effectRef idx="0">
+              <a:schemeClr val="accent1"/>
+            </a:effectRef>
+            <a:fontRef idx="minor">
+              <a:schemeClr val="tx1"/>
+            </a:fontRef>
+          </p:style>
+        </p:cxnSp>
+        <p:cxnSp>
+          <p:nvCxnSpPr>
+            <p:cNvPr id="23" name="Straight Arrow Connector 22"/>
+            <p:cNvCxnSpPr>
+              <a:stCxn id="5" idx="3"/>
+              <a:endCxn id="76" idx="3"/>
+            </p:cNvCxnSpPr>
+            <p:nvPr/>
+          </p:nvCxnSpPr>
+          <p:spPr>
+            <a:xfrm>
+              <a:off x="1642302" y="4247398"/>
+              <a:ext cx="1012903" cy="1054157"/>
+            </a:xfrm>
+            <a:prstGeom prst="straightConnector1">
+              <a:avLst/>
+            </a:prstGeom>
+            <a:ln w="25400">
+              <a:solidFill>
+                <a:schemeClr val="tx1"/>
+              </a:solidFill>
+              <a:tailEnd type="arrow"/>
+            </a:ln>
+          </p:spPr>
+          <p:style>
+            <a:lnRef idx="1">
+              <a:schemeClr val="accent1"/>
+            </a:lnRef>
+            <a:fillRef idx="0">
+              <a:schemeClr val="accent1"/>
+            </a:fillRef>
+            <a:effectRef idx="0">
+              <a:schemeClr val="accent1"/>
+            </a:effectRef>
+            <a:fontRef idx="minor">
+              <a:schemeClr val="tx1"/>
+            </a:fontRef>
+          </p:style>
+        </p:cxnSp>
+        <p:sp>
+          <p:nvSpPr>
+            <p:cNvPr id="22" name="Left Brace 21"/>
+            <p:cNvSpPr/>
+            <p:nvPr/>
+          </p:nvSpPr>
+          <p:spPr>
+            <a:xfrm rot="10800000">
+              <a:off x="3342666" y="5301556"/>
+              <a:ext cx="313601" cy="976664"/>
+            </a:xfrm>
+            <a:prstGeom prst="leftBrace">
+              <a:avLst>
+                <a:gd name="adj1" fmla="val 8333"/>
+                <a:gd name="adj2" fmla="val 50401"/>
+              </a:avLst>
+            </a:prstGeom>
+            <a:ln w="25400"/>
+          </p:spPr>
+          <p:style>
+            <a:lnRef idx="1">
+              <a:schemeClr val="dk1"/>
+            </a:lnRef>
+            <a:fillRef idx="0">
+              <a:schemeClr val="dk1"/>
+            </a:fillRef>
+            <a:effectRef idx="0">
+              <a:schemeClr val="dk1"/>
+            </a:effectRef>
+            <a:fontRef idx="minor">
+              <a:schemeClr val="tx1"/>
+            </a:fontRef>
+          </p:style>
+          <p:txBody>
+            <a:bodyPr rtlCol="0" anchor="ctr"/>
+            <a:lstStyle/>
+            <a:p>
+              <a:pPr algn="ctr"/>
+              <a:endParaRPr lang="en-NZ"/>
+            </a:p>
+          </p:txBody>
+        </p:sp>
+        <p:sp>
+          <p:nvSpPr>
+            <p:cNvPr id="24" name="TextBox 23"/>
+            <p:cNvSpPr txBox="1"/>
+            <p:nvPr/>
+          </p:nvSpPr>
+          <p:spPr>
+            <a:xfrm>
+              <a:off x="3643766" y="5488509"/>
+              <a:ext cx="1390124" cy="461665"/>
+            </a:xfrm>
+            <a:prstGeom prst="rect">
+              <a:avLst/>
+            </a:prstGeom>
+            <a:noFill/>
+          </p:spPr>
+          <p:txBody>
+            <a:bodyPr wrap="none" rtlCol="0">
+              <a:spAutoFit/>
+            </a:bodyPr>
+            <a:lstStyle/>
+            <a:p>
+              <a:r>
+                <a:rPr lang="en-NZ" sz="2400" dirty="0" smtClean="0"/>
+                <a:t>ARFF files</a:t>
+              </a:r>
+              <a:endParaRPr lang="en-NZ" sz="2400" dirty="0"/>
+            </a:p>
+          </p:txBody>
+        </p:sp>
+        <p:sp>
+          <p:nvSpPr>
+            <p:cNvPr id="56" name="Flowchart: Magnetic Disk 3"/>
+            <p:cNvSpPr/>
+            <p:nvPr/>
+          </p:nvSpPr>
+          <p:spPr>
+            <a:xfrm>
+              <a:off x="1676703" y="230659"/>
+              <a:ext cx="1351732" cy="908838"/>
+            </a:xfrm>
+            <a:prstGeom prst="cloud">
+              <a:avLst/>
+            </a:prstGeom>
+            <a:noFill/>
+            <a:ln>
+              <a:solidFill>
+                <a:schemeClr val="tx1"/>
+              </a:solidFill>
+            </a:ln>
+          </p:spPr>
+          <p:style>
+            <a:lnRef idx="2">
+              <a:schemeClr val="accent1">
+                <a:shade val="50000"/>
+              </a:schemeClr>
+            </a:lnRef>
+            <a:fillRef idx="1">
+              <a:schemeClr val="accent1"/>
+            </a:fillRef>
+            <a:effectRef idx="0">
+              <a:schemeClr val="accent1"/>
+            </a:effectRef>
+            <a:fontRef idx="minor">
+              <a:schemeClr val="lt1"/>
+            </a:fontRef>
+          </p:style>
+          <p:txBody>
+            <a:bodyPr rtlCol="0" anchor="ctr"/>
+            <a:lstStyle/>
+            <a:p>
+              <a:pPr algn="ctr"/>
+              <a:r>
+                <a:rPr lang="en-NZ" sz="1100" dirty="0" smtClean="0">
+                  <a:solidFill>
+                    <a:schemeClr val="tx1"/>
+                  </a:solidFill>
+                </a:rPr>
+                <a:t>NCBI/iBOL</a:t>
+              </a:r>
+              <a:endParaRPr lang="en-NZ" sz="1100" dirty="0">
+                <a:solidFill>
+                  <a:schemeClr val="tx1"/>
+                </a:solidFill>
+              </a:endParaRPr>
+            </a:p>
+          </p:txBody>
+        </p:sp>
+        <p:cxnSp>
+          <p:nvCxnSpPr>
+            <p:cNvPr id="57" name="Straight Arrow Connector 56"/>
+            <p:cNvCxnSpPr>
+              <a:stCxn id="56" idx="1"/>
+              <a:endCxn id="4" idx="1"/>
+            </p:cNvCxnSpPr>
+            <p:nvPr/>
+          </p:nvCxnSpPr>
+          <p:spPr>
+            <a:xfrm>
+              <a:off x="2352569" y="1138529"/>
+              <a:ext cx="0" cy="381398"/>
+            </a:xfrm>
+            <a:prstGeom prst="straightConnector1">
+              <a:avLst/>
+            </a:prstGeom>
+            <a:ln w="25400">
+              <a:solidFill>
+                <a:schemeClr val="tx1"/>
+              </a:solidFill>
+              <a:tailEnd type="arrow"/>
+            </a:ln>
+          </p:spPr>
+          <p:style>
+            <a:lnRef idx="1">
+              <a:schemeClr val="accent1"/>
+            </a:lnRef>
+            <a:fillRef idx="0">
+              <a:schemeClr val="accent1"/>
+            </a:fillRef>
+            <a:effectRef idx="0">
+              <a:schemeClr val="accent1"/>
+            </a:effectRef>
+            <a:fontRef idx="minor">
+              <a:schemeClr val="tx1"/>
+            </a:fontRef>
+          </p:style>
+        </p:cxnSp>
+        <p:sp>
+          <p:nvSpPr>
+            <p:cNvPr id="72" name="Snip Single Corner Rectangle 71"/>
+            <p:cNvSpPr/>
+            <p:nvPr/>
+          </p:nvSpPr>
+          <p:spPr>
+            <a:xfrm>
+              <a:off x="1294400" y="5301555"/>
+              <a:ext cx="746463" cy="976667"/>
+            </a:xfrm>
+            <a:prstGeom prst="snip1Rect">
+              <a:avLst/>
+            </a:prstGeom>
+            <a:noFill/>
+            <a:ln>
+              <a:solidFill>
+                <a:schemeClr val="tx1"/>
+              </a:solidFill>
+            </a:ln>
+          </p:spPr>
+          <p:style>
+            <a:lnRef idx="2">
+              <a:schemeClr val="accent1">
+                <a:shade val="50000"/>
+              </a:schemeClr>
+            </a:lnRef>
+            <a:fillRef idx="1">
+              <a:schemeClr val="accent1"/>
+            </a:fillRef>
+            <a:effectRef idx="0">
+              <a:schemeClr val="accent1"/>
+            </a:effectRef>
+            <a:fontRef idx="minor">
+              <a:schemeClr val="lt1"/>
+            </a:fontRef>
+          </p:style>
+          <p:txBody>
+            <a:bodyPr rtlCol="0" anchor="ctr"/>
+            <a:lstStyle/>
+            <a:p>
+              <a:pPr algn="ctr"/>
+              <a:r>
+                <a:rPr lang="en-NZ" sz="1200" dirty="0" smtClean="0">
+                  <a:solidFill>
+                    <a:schemeClr val="tx1"/>
+                  </a:solidFill>
+                </a:rPr>
+                <a:t>…</a:t>
+              </a:r>
+              <a:endParaRPr lang="en-NZ" sz="1200" dirty="0">
+                <a:solidFill>
+                  <a:schemeClr val="tx1"/>
+                </a:solidFill>
+              </a:endParaRPr>
+            </a:p>
+          </p:txBody>
+        </p:sp>
+        <p:sp>
+          <p:nvSpPr>
+            <p:cNvPr id="76" name="Snip Single Corner Rectangle 75"/>
+            <p:cNvSpPr/>
+            <p:nvPr/>
+          </p:nvSpPr>
+          <p:spPr>
+            <a:xfrm>
+              <a:off x="2281973" y="5301555"/>
+              <a:ext cx="746463" cy="976666"/>
+            </a:xfrm>
+            <a:prstGeom prst="snip1Rect">
+              <a:avLst/>
+            </a:prstGeom>
+            <a:noFill/>
+            <a:ln>
+              <a:solidFill>
+                <a:schemeClr val="tx1"/>
+              </a:solidFill>
+            </a:ln>
+          </p:spPr>
+          <p:style>
+            <a:lnRef idx="2">
+              <a:schemeClr val="accent1">
+                <a:shade val="50000"/>
+              </a:schemeClr>
+            </a:lnRef>
+            <a:fillRef idx="1">
+              <a:schemeClr val="accent1"/>
+            </a:fillRef>
+            <a:effectRef idx="0">
+              <a:schemeClr val="accent1"/>
+            </a:effectRef>
+            <a:fontRef idx="minor">
+              <a:schemeClr val="lt1"/>
+            </a:fontRef>
+          </p:style>
+          <p:txBody>
+            <a:bodyPr rtlCol="0" anchor="ctr"/>
+            <a:lstStyle/>
+            <a:p>
+              <a:pPr algn="ctr"/>
+              <a:r>
+                <a:rPr lang="en-NZ" sz="1200" dirty="0" smtClean="0">
+                  <a:solidFill>
+                    <a:schemeClr val="tx1"/>
+                  </a:solidFill>
+                </a:rPr>
+                <a:t>k</a:t>
+              </a:r>
+              <a:r>
+                <a:rPr lang="en-NZ" sz="1200" baseline="-25000" dirty="0" smtClean="0">
+                  <a:solidFill>
+                    <a:schemeClr val="tx1"/>
+                  </a:solidFill>
+                </a:rPr>
+                <a:t>min</a:t>
+              </a:r>
+              <a:r>
+                <a:rPr lang="en-NZ" sz="1200" dirty="0" smtClean="0">
+                  <a:solidFill>
+                    <a:schemeClr val="tx1"/>
+                  </a:solidFill>
+                </a:rPr>
+                <a:t>=1</a:t>
+              </a:r>
+            </a:p>
+            <a:p>
+              <a:pPr algn="ctr"/>
+              <a:r>
+                <a:rPr lang="en-NZ" sz="1200" dirty="0">
+                  <a:solidFill>
+                    <a:schemeClr val="tx1"/>
+                  </a:solidFill>
+                </a:rPr>
+                <a:t>k</a:t>
+              </a:r>
+              <a:r>
+                <a:rPr lang="en-NZ" sz="1200" baseline="-25000" dirty="0" smtClean="0">
+                  <a:solidFill>
+                    <a:schemeClr val="tx1"/>
+                  </a:solidFill>
+                </a:rPr>
+                <a:t>max</a:t>
+              </a:r>
+              <a:r>
+                <a:rPr lang="en-NZ" sz="1200" dirty="0" smtClean="0">
+                  <a:solidFill>
+                    <a:schemeClr val="tx1"/>
+                  </a:solidFill>
+                </a:rPr>
+                <a:t>=6</a:t>
+              </a:r>
+              <a:endParaRPr lang="en-NZ" sz="1200" dirty="0">
+                <a:solidFill>
+                  <a:schemeClr val="tx1"/>
+                </a:solidFill>
+              </a:endParaRPr>
+            </a:p>
+          </p:txBody>
+        </p:sp>
+        <p:sp>
+          <p:nvSpPr>
+            <p:cNvPr id="96" name="TextBox 95"/>
+            <p:cNvSpPr txBox="1"/>
+            <p:nvPr/>
+          </p:nvSpPr>
+          <p:spPr>
+            <a:xfrm>
+              <a:off x="3815287" y="4793140"/>
+              <a:ext cx="344038" cy="369333"/>
+            </a:xfrm>
+            <a:prstGeom prst="rect">
+              <a:avLst/>
+            </a:prstGeom>
+            <a:noFill/>
+          </p:spPr>
+          <p:txBody>
+            <a:bodyPr wrap="none" rtlCol="0">
+              <a:spAutoFit/>
+            </a:bodyPr>
+            <a:lstStyle/>
+            <a:p>
+              <a:r>
+                <a:rPr lang="en-US" dirty="0" smtClean="0"/>
+                <a:t>…</a:t>
+              </a:r>
+              <a:endParaRPr lang="en-US" dirty="0"/>
+            </a:p>
+          </p:txBody>
+        </p:sp>
+        <p:cxnSp>
+          <p:nvCxnSpPr>
+            <p:cNvPr id="97" name="Straight Arrow Connector 96"/>
+            <p:cNvCxnSpPr/>
+            <p:nvPr/>
+          </p:nvCxnSpPr>
+          <p:spPr>
+            <a:xfrm>
+              <a:off x="3984860" y="4247399"/>
+              <a:ext cx="0" cy="684477"/>
+            </a:xfrm>
+            <a:prstGeom prst="straightConnector1">
+              <a:avLst/>
+            </a:prstGeom>
+            <a:ln w="25400">
+              <a:solidFill>
+                <a:schemeClr val="tx1"/>
+              </a:solidFill>
+              <a:tailEnd type="arrow"/>
+            </a:ln>
+          </p:spPr>
+          <p:style>
+            <a:lnRef idx="1">
+              <a:schemeClr val="accent1"/>
+            </a:lnRef>
+            <a:fillRef idx="0">
+              <a:schemeClr val="accent1"/>
+            </a:fillRef>
+            <a:effectRef idx="0">
+              <a:schemeClr val="accent1"/>
+            </a:effectRef>
+            <a:fontRef idx="minor">
+              <a:schemeClr val="tx1"/>
+            </a:fontRef>
+          </p:style>
+        </p:cxnSp>
+        <p:cxnSp>
+          <p:nvCxnSpPr>
+            <p:cNvPr id="102" name="Straight Arrow Connector 101"/>
+            <p:cNvCxnSpPr>
+              <a:stCxn id="7" idx="3"/>
+            </p:cNvCxnSpPr>
+            <p:nvPr/>
+          </p:nvCxnSpPr>
+          <p:spPr>
+            <a:xfrm>
+              <a:off x="4932383" y="4247400"/>
+              <a:ext cx="0" cy="684477"/>
+            </a:xfrm>
+            <a:prstGeom prst="straightConnector1">
+              <a:avLst/>
+            </a:prstGeom>
+            <a:ln w="25400">
+              <a:solidFill>
+                <a:schemeClr val="tx1"/>
+              </a:solidFill>
+              <a:tailEnd type="arrow"/>
+            </a:ln>
+          </p:spPr>
+          <p:style>
+            <a:lnRef idx="1">
+              <a:schemeClr val="accent1"/>
+            </a:lnRef>
+            <a:fillRef idx="0">
+              <a:schemeClr val="accent1"/>
+            </a:fillRef>
+            <a:effectRef idx="0">
+              <a:schemeClr val="accent1"/>
+            </a:effectRef>
+            <a:fontRef idx="minor">
+              <a:schemeClr val="tx1"/>
+            </a:fontRef>
+          </p:style>
+        </p:cxnSp>
+        <p:sp>
+          <p:nvSpPr>
+            <p:cNvPr id="104" name="TextBox 103"/>
+            <p:cNvSpPr txBox="1"/>
+            <p:nvPr/>
+          </p:nvSpPr>
+          <p:spPr>
+            <a:xfrm>
+              <a:off x="4760363" y="4793141"/>
+              <a:ext cx="344038" cy="369333"/>
+            </a:xfrm>
+            <a:prstGeom prst="rect">
+              <a:avLst/>
+            </a:prstGeom>
+            <a:noFill/>
+          </p:spPr>
+          <p:txBody>
+            <a:bodyPr wrap="none" rtlCol="0">
+              <a:spAutoFit/>
+            </a:bodyPr>
+            <a:lstStyle/>
+            <a:p>
+              <a:r>
+                <a:rPr lang="en-US" dirty="0" smtClean="0"/>
+                <a:t>…</a:t>
+              </a:r>
+              <a:endParaRPr lang="en-US" dirty="0"/>
+            </a:p>
+          </p:txBody>
+        </p:sp>
+        <p:sp>
+          <p:nvSpPr>
+            <p:cNvPr id="105" name="TextBox 104"/>
+            <p:cNvSpPr txBox="1"/>
+            <p:nvPr/>
+          </p:nvSpPr>
+          <p:spPr>
+            <a:xfrm>
+              <a:off x="5676604" y="4793139"/>
+              <a:ext cx="344039" cy="369333"/>
+            </a:xfrm>
+            <a:prstGeom prst="rect">
+              <a:avLst/>
+            </a:prstGeom>
+            <a:noFill/>
+          </p:spPr>
+          <p:txBody>
+            <a:bodyPr wrap="none" rtlCol="0">
+              <a:spAutoFit/>
+            </a:bodyPr>
+            <a:lstStyle/>
+            <a:p>
+              <a:r>
+                <a:rPr lang="en-US" dirty="0" smtClean="0"/>
+                <a:t>…</a:t>
+              </a:r>
+              <a:endParaRPr lang="en-US" dirty="0"/>
+            </a:p>
+          </p:txBody>
+        </p:sp>
+        <p:cxnSp>
+          <p:nvCxnSpPr>
+            <p:cNvPr id="106" name="Straight Arrow Connector 105"/>
+            <p:cNvCxnSpPr/>
+            <p:nvPr/>
+          </p:nvCxnSpPr>
+          <p:spPr>
+            <a:xfrm>
+              <a:off x="5846177" y="4247399"/>
+              <a:ext cx="0" cy="684477"/>
+            </a:xfrm>
+            <a:prstGeom prst="straightConnector1">
+              <a:avLst/>
+            </a:prstGeom>
+            <a:ln w="25400">
+              <a:solidFill>
+                <a:schemeClr val="tx1"/>
+              </a:solidFill>
+              <a:tailEnd type="arrow"/>
+            </a:ln>
+          </p:spPr>
+          <p:style>
+            <a:lnRef idx="1">
+              <a:schemeClr val="accent1"/>
+            </a:lnRef>
+            <a:fillRef idx="0">
+              <a:schemeClr val="accent1"/>
+            </a:fillRef>
+            <a:effectRef idx="0">
+              <a:schemeClr val="accent1"/>
+            </a:effectRef>
+            <a:fontRef idx="minor">
+              <a:schemeClr val="tx1"/>
+            </a:fontRef>
+          </p:style>
+        </p:cxnSp>
+      </p:grpSp>
+    </p:spTree>
+    <p:extLst>
+      <p:ext uri="{BB962C8B-B14F-4D97-AF65-F5344CB8AC3E}">
+        <p14:creationId xmlns:p14="http://schemas.microsoft.com/office/powerpoint/2010/main" val="4130961535"/>
       </p:ext>
     </p:extLst>
   </p:cSld>

</xml_diff>